<commit_message>
UI adjustments on the prayer overview page. When a past date is selected, all prayers are displayed; when a future date is selected, no prayers are shown as they haven't occurred yet. Added a prayer statistics page with prayer charts. The chart is currently just the design. Functionality will follow.
</commit_message>
<xml_diff>
--- a/assets/images/Microsoft PowerPoint-Präsentation (neu).pptx
+++ b/assets/images/Microsoft PowerPoint-Präsentation (neu).pptx
@@ -104,6 +104,11 @@
       </a:defRPr>
     </a:lvl9pPr>
   </p:defaultTextStyle>
+  <p:extLst>
+    <p:ext uri="{EFAFB233-063F-42B5-8137-9DF3F51BA10A}">
+      <p15:sldGuideLst xmlns:p15="http://schemas.microsoft.com/office/powerpoint/2012/main"/>
+    </p:ext>
+  </p:extLst>
 </p:presentation>
 </file>
 
@@ -3343,9 +3348,8 @@
               </a:ext>
             </a:extLst>
           </a:blip>
-          <a:stretch>
-            <a:fillRect/>
-          </a:stretch>
+          <a:srcRect/>
+          <a:stretch/>
         </p:blipFill>
         <p:spPr>
           <a:xfrm>
@@ -3390,9 +3394,8 @@
               </a:ext>
             </a:extLst>
           </a:blip>
-          <a:stretch>
-            <a:fillRect/>
-          </a:stretch>
+          <a:srcRect/>
+          <a:stretch/>
         </p:blipFill>
         <p:spPr>
           <a:xfrm>
@@ -3437,9 +3440,8 @@
               </a:ext>
             </a:extLst>
           </a:blip>
-          <a:stretch>
-            <a:fillRect/>
-          </a:stretch>
+          <a:srcRect/>
+          <a:stretch/>
         </p:blipFill>
         <p:spPr>
           <a:xfrm>
@@ -3484,9 +3486,8 @@
               </a:ext>
             </a:extLst>
           </a:blip>
-          <a:stretch>
-            <a:fillRect/>
-          </a:stretch>
+          <a:srcRect/>
+          <a:stretch/>
         </p:blipFill>
         <p:spPr>
           <a:xfrm>
@@ -3531,9 +3532,8 @@
               </a:ext>
             </a:extLst>
           </a:blip>
-          <a:stretch>
-            <a:fillRect/>
-          </a:stretch>
+          <a:srcRect/>
+          <a:stretch/>
         </p:blipFill>
         <p:spPr>
           <a:xfrm>

</xml_diff>

<commit_message>
Refactor code, fix TypeScript issues, update UI on 'Current Prayer' page to include prayer times for all prayers, and implement API request for prayer times based on selected date
</commit_message>
<xml_diff>
--- a/assets/images/Microsoft PowerPoint-Präsentation (neu).pptx
+++ b/assets/images/Microsoft PowerPoint-Präsentation (neu).pptx
@@ -6,6 +6,7 @@
   </p:sldMasterIdLst>
   <p:sldIdLst>
     <p:sldId id="256" r:id="rId2"/>
+    <p:sldId id="257" r:id="rId3"/>
   </p:sldIdLst>
   <p:sldSz cx="12192000" cy="6858000"/>
   <p:notesSz cx="6858000" cy="9144000"/>
@@ -259,7 +260,7 @@
           <a:p>
             <a:fld id="{47EB0950-2E12-47AF-8353-23719C948F9C}" type="datetimeFigureOut">
               <a:rPr lang="de-DE" smtClean="0"/>
-              <a:t>07.11.2024</a:t>
+              <a:t>08.11.2024</a:t>
             </a:fld>
             <a:endParaRPr lang="de-DE"/>
           </a:p>
@@ -457,7 +458,7 @@
           <a:p>
             <a:fld id="{47EB0950-2E12-47AF-8353-23719C948F9C}" type="datetimeFigureOut">
               <a:rPr lang="de-DE" smtClean="0"/>
-              <a:t>07.11.2024</a:t>
+              <a:t>08.11.2024</a:t>
             </a:fld>
             <a:endParaRPr lang="de-DE"/>
           </a:p>
@@ -665,7 +666,7 @@
           <a:p>
             <a:fld id="{47EB0950-2E12-47AF-8353-23719C948F9C}" type="datetimeFigureOut">
               <a:rPr lang="de-DE" smtClean="0"/>
-              <a:t>07.11.2024</a:t>
+              <a:t>08.11.2024</a:t>
             </a:fld>
             <a:endParaRPr lang="de-DE"/>
           </a:p>
@@ -863,7 +864,7 @@
           <a:p>
             <a:fld id="{47EB0950-2E12-47AF-8353-23719C948F9C}" type="datetimeFigureOut">
               <a:rPr lang="de-DE" smtClean="0"/>
-              <a:t>07.11.2024</a:t>
+              <a:t>08.11.2024</a:t>
             </a:fld>
             <a:endParaRPr lang="de-DE"/>
           </a:p>
@@ -1138,7 +1139,7 @@
           <a:p>
             <a:fld id="{47EB0950-2E12-47AF-8353-23719C948F9C}" type="datetimeFigureOut">
               <a:rPr lang="de-DE" smtClean="0"/>
-              <a:t>07.11.2024</a:t>
+              <a:t>08.11.2024</a:t>
             </a:fld>
             <a:endParaRPr lang="de-DE"/>
           </a:p>
@@ -1403,7 +1404,7 @@
           <a:p>
             <a:fld id="{47EB0950-2E12-47AF-8353-23719C948F9C}" type="datetimeFigureOut">
               <a:rPr lang="de-DE" smtClean="0"/>
-              <a:t>07.11.2024</a:t>
+              <a:t>08.11.2024</a:t>
             </a:fld>
             <a:endParaRPr lang="de-DE"/>
           </a:p>
@@ -1815,7 +1816,7 @@
           <a:p>
             <a:fld id="{47EB0950-2E12-47AF-8353-23719C948F9C}" type="datetimeFigureOut">
               <a:rPr lang="de-DE" smtClean="0"/>
-              <a:t>07.11.2024</a:t>
+              <a:t>08.11.2024</a:t>
             </a:fld>
             <a:endParaRPr lang="de-DE"/>
           </a:p>
@@ -1956,7 +1957,7 @@
           <a:p>
             <a:fld id="{47EB0950-2E12-47AF-8353-23719C948F9C}" type="datetimeFigureOut">
               <a:rPr lang="de-DE" smtClean="0"/>
-              <a:t>07.11.2024</a:t>
+              <a:t>08.11.2024</a:t>
             </a:fld>
             <a:endParaRPr lang="de-DE"/>
           </a:p>
@@ -2069,7 +2070,7 @@
           <a:p>
             <a:fld id="{47EB0950-2E12-47AF-8353-23719C948F9C}" type="datetimeFigureOut">
               <a:rPr lang="de-DE" smtClean="0"/>
-              <a:t>07.11.2024</a:t>
+              <a:t>08.11.2024</a:t>
             </a:fld>
             <a:endParaRPr lang="de-DE"/>
           </a:p>
@@ -2380,7 +2381,7 @@
           <a:p>
             <a:fld id="{47EB0950-2E12-47AF-8353-23719C948F9C}" type="datetimeFigureOut">
               <a:rPr lang="de-DE" smtClean="0"/>
-              <a:t>07.11.2024</a:t>
+              <a:t>08.11.2024</a:t>
             </a:fld>
             <a:endParaRPr lang="de-DE"/>
           </a:p>
@@ -2668,7 +2669,7 @@
           <a:p>
             <a:fld id="{47EB0950-2E12-47AF-8353-23719C948F9C}" type="datetimeFigureOut">
               <a:rPr lang="de-DE" smtClean="0"/>
-              <a:t>07.11.2024</a:t>
+              <a:t>08.11.2024</a:t>
             </a:fld>
             <a:endParaRPr lang="de-DE"/>
           </a:p>
@@ -2909,7 +2910,7 @@
           <a:p>
             <a:fld id="{47EB0950-2E12-47AF-8353-23719C948F9C}" type="datetimeFigureOut">
               <a:rPr lang="de-DE" smtClean="0"/>
-              <a:t>07.11.2024</a:t>
+              <a:t>08.11.2024</a:t>
             </a:fld>
             <a:endParaRPr lang="de-DE"/>
           </a:p>
@@ -3569,6 +3570,272 @@
 </p:sld>
 </file>
 
+<file path=ppt/slides/slide2.xml><?xml version="1.0" encoding="utf-8"?>
+<p:sld xmlns:a="http://schemas.openxmlformats.org/drawingml/2006/main" xmlns:r="http://schemas.openxmlformats.org/officeDocument/2006/relationships" xmlns:p="http://schemas.openxmlformats.org/presentationml/2006/main">
+  <p:cSld>
+    <p:spTree>
+      <p:nvGrpSpPr>
+        <p:cNvPr id="1" name="">
+          <a:extLst>
+            <a:ext uri="{FF2B5EF4-FFF2-40B4-BE49-F238E27FC236}">
+              <a16:creationId xmlns:a16="http://schemas.microsoft.com/office/drawing/2014/main" id="{91F7B739-0245-1DFA-84FA-2C0A3AE9EE24}"/>
+            </a:ext>
+          </a:extLst>
+        </p:cNvPr>
+        <p:cNvGrpSpPr/>
+        <p:nvPr/>
+      </p:nvGrpSpPr>
+      <p:grpSpPr>
+        <a:xfrm>
+          <a:off x="0" y="0"/>
+          <a:ext cx="0" cy="0"/>
+          <a:chOff x="0" y="0"/>
+          <a:chExt cx="0" cy="0"/>
+        </a:xfrm>
+      </p:grpSpPr>
+      <p:pic>
+        <p:nvPicPr>
+          <p:cNvPr id="9" name="Grafik 8">
+            <a:extLst>
+              <a:ext uri="{FF2B5EF4-FFF2-40B4-BE49-F238E27FC236}">
+                <a16:creationId xmlns:a16="http://schemas.microsoft.com/office/drawing/2014/main" id="{1E15727C-60DE-E54F-FDC3-8919470D9289}"/>
+              </a:ext>
+            </a:extLst>
+          </p:cNvPr>
+          <p:cNvPicPr>
+            <a:picLocks noChangeAspect="1"/>
+          </p:cNvPicPr>
+          <p:nvPr/>
+        </p:nvPicPr>
+        <p:blipFill>
+          <a:blip r:embed="rId2">
+            <a:extLst>
+              <a:ext uri="{28A0092B-C50C-407E-A947-70E740481C1C}">
+                <a14:useLocalDpi xmlns:a14="http://schemas.microsoft.com/office/drawing/2010/main" val="0"/>
+              </a:ext>
+            </a:extLst>
+          </a:blip>
+          <a:srcRect/>
+          <a:stretch/>
+        </p:blipFill>
+        <p:spPr>
+          <a:xfrm>
+            <a:off x="5879850" y="-4405648"/>
+            <a:ext cx="6858000" cy="6858000"/>
+          </a:xfrm>
+          <a:prstGeom prst="roundRect">
+            <a:avLst>
+              <a:gd name="adj" fmla="val 8594"/>
+            </a:avLst>
+          </a:prstGeom>
+          <a:solidFill>
+            <a:srgbClr val="FFFFFF">
+              <a:shade val="85000"/>
+            </a:srgbClr>
+          </a:solidFill>
+          <a:ln>
+            <a:noFill/>
+          </a:ln>
+          <a:effectLst/>
+        </p:spPr>
+      </p:pic>
+      <p:pic>
+        <p:nvPicPr>
+          <p:cNvPr id="11" name="Grafik 10">
+            <a:extLst>
+              <a:ext uri="{FF2B5EF4-FFF2-40B4-BE49-F238E27FC236}">
+                <a16:creationId xmlns:a16="http://schemas.microsoft.com/office/drawing/2014/main" id="{98E9F0F9-A2CC-9F6D-B346-22F60B82196C}"/>
+              </a:ext>
+            </a:extLst>
+          </p:cNvPr>
+          <p:cNvPicPr>
+            <a:picLocks noChangeAspect="1"/>
+          </p:cNvPicPr>
+          <p:nvPr/>
+        </p:nvPicPr>
+        <p:blipFill>
+          <a:blip r:embed="rId3">
+            <a:extLst>
+              <a:ext uri="{28A0092B-C50C-407E-A947-70E740481C1C}">
+                <a14:useLocalDpi xmlns:a14="http://schemas.microsoft.com/office/drawing/2010/main" val="0"/>
+              </a:ext>
+            </a:extLst>
+          </a:blip>
+          <a:srcRect/>
+          <a:stretch/>
+        </p:blipFill>
+        <p:spPr>
+          <a:xfrm>
+            <a:off x="-1161030" y="-4405648"/>
+            <a:ext cx="6858000" cy="6858000"/>
+          </a:xfrm>
+          <a:prstGeom prst="roundRect">
+            <a:avLst>
+              <a:gd name="adj" fmla="val 8594"/>
+            </a:avLst>
+          </a:prstGeom>
+          <a:solidFill>
+            <a:srgbClr val="FFFFFF">
+              <a:shade val="85000"/>
+            </a:srgbClr>
+          </a:solidFill>
+          <a:ln>
+            <a:noFill/>
+          </a:ln>
+          <a:effectLst/>
+        </p:spPr>
+      </p:pic>
+      <p:pic>
+        <p:nvPicPr>
+          <p:cNvPr id="13" name="Grafik 12">
+            <a:extLst>
+              <a:ext uri="{FF2B5EF4-FFF2-40B4-BE49-F238E27FC236}">
+                <a16:creationId xmlns:a16="http://schemas.microsoft.com/office/drawing/2014/main" id="{B4FDFCA1-F7D2-2A2D-BF5F-AE51131186EE}"/>
+              </a:ext>
+            </a:extLst>
+          </p:cNvPr>
+          <p:cNvPicPr>
+            <a:picLocks noChangeAspect="1"/>
+          </p:cNvPicPr>
+          <p:nvPr/>
+        </p:nvPicPr>
+        <p:blipFill>
+          <a:blip r:embed="rId4">
+            <a:extLst>
+              <a:ext uri="{28A0092B-C50C-407E-A947-70E740481C1C}">
+                <a14:useLocalDpi xmlns:a14="http://schemas.microsoft.com/office/drawing/2010/main" val="0"/>
+              </a:ext>
+            </a:extLst>
+          </a:blip>
+          <a:srcRect/>
+          <a:stretch/>
+        </p:blipFill>
+        <p:spPr>
+          <a:xfrm>
+            <a:off x="-1161030" y="2587818"/>
+            <a:ext cx="6858000" cy="6858000"/>
+          </a:xfrm>
+          <a:prstGeom prst="roundRect">
+            <a:avLst>
+              <a:gd name="adj" fmla="val 8594"/>
+            </a:avLst>
+          </a:prstGeom>
+          <a:solidFill>
+            <a:srgbClr val="FFFFFF">
+              <a:shade val="85000"/>
+            </a:srgbClr>
+          </a:solidFill>
+          <a:ln>
+            <a:noFill/>
+          </a:ln>
+          <a:effectLst/>
+        </p:spPr>
+      </p:pic>
+      <p:pic>
+        <p:nvPicPr>
+          <p:cNvPr id="2" name="Grafik 1">
+            <a:extLst>
+              <a:ext uri="{FF2B5EF4-FFF2-40B4-BE49-F238E27FC236}">
+                <a16:creationId xmlns:a16="http://schemas.microsoft.com/office/drawing/2014/main" id="{80B2E8AE-91ED-76F2-5FC0-97A872D41F7B}"/>
+              </a:ext>
+            </a:extLst>
+          </p:cNvPr>
+          <p:cNvPicPr>
+            <a:picLocks noChangeAspect="1"/>
+          </p:cNvPicPr>
+          <p:nvPr/>
+        </p:nvPicPr>
+        <p:blipFill>
+          <a:blip r:embed="rId5">
+            <a:extLst>
+              <a:ext uri="{28A0092B-C50C-407E-A947-70E740481C1C}">
+                <a14:useLocalDpi xmlns:a14="http://schemas.microsoft.com/office/drawing/2010/main" val="0"/>
+              </a:ext>
+            </a:extLst>
+          </a:blip>
+          <a:srcRect/>
+          <a:stretch/>
+        </p:blipFill>
+        <p:spPr>
+          <a:xfrm>
+            <a:off x="5879850" y="2587818"/>
+            <a:ext cx="6858000" cy="6858000"/>
+          </a:xfrm>
+          <a:prstGeom prst="roundRect">
+            <a:avLst>
+              <a:gd name="adj" fmla="val 8594"/>
+            </a:avLst>
+          </a:prstGeom>
+          <a:solidFill>
+            <a:srgbClr val="FFFFFF">
+              <a:shade val="85000"/>
+            </a:srgbClr>
+          </a:solidFill>
+          <a:ln>
+            <a:noFill/>
+          </a:ln>
+          <a:effectLst/>
+        </p:spPr>
+      </p:pic>
+      <p:pic>
+        <p:nvPicPr>
+          <p:cNvPr id="3" name="Grafik 2">
+            <a:extLst>
+              <a:ext uri="{FF2B5EF4-FFF2-40B4-BE49-F238E27FC236}">
+                <a16:creationId xmlns:a16="http://schemas.microsoft.com/office/drawing/2014/main" id="{820BB0AD-6306-EB64-81CD-F16B95B464BC}"/>
+              </a:ext>
+            </a:extLst>
+          </p:cNvPr>
+          <p:cNvPicPr>
+            <a:picLocks noChangeAspect="1"/>
+          </p:cNvPicPr>
+          <p:nvPr/>
+        </p:nvPicPr>
+        <p:blipFill>
+          <a:blip r:embed="rId6">
+            <a:extLst>
+              <a:ext uri="{28A0092B-C50C-407E-A947-70E740481C1C}">
+                <a14:useLocalDpi xmlns:a14="http://schemas.microsoft.com/office/drawing/2010/main" val="0"/>
+              </a:ext>
+            </a:extLst>
+          </a:blip>
+          <a:srcRect/>
+          <a:stretch/>
+        </p:blipFill>
+        <p:spPr>
+          <a:xfrm>
+            <a:off x="2450850" y="-841182"/>
+            <a:ext cx="6858000" cy="6858000"/>
+          </a:xfrm>
+          <a:prstGeom prst="roundRect">
+            <a:avLst>
+              <a:gd name="adj" fmla="val 8594"/>
+            </a:avLst>
+          </a:prstGeom>
+          <a:solidFill>
+            <a:srgbClr val="FFFFFF">
+              <a:shade val="85000"/>
+            </a:srgbClr>
+          </a:solidFill>
+          <a:ln>
+            <a:noFill/>
+          </a:ln>
+          <a:effectLst/>
+        </p:spPr>
+      </p:pic>
+    </p:spTree>
+    <p:extLst>
+      <p:ext uri="{BB962C8B-B14F-4D97-AF65-F5344CB8AC3E}">
+        <p14:creationId xmlns:p14="http://schemas.microsoft.com/office/powerpoint/2010/main" val="119039273"/>
+      </p:ext>
+    </p:extLst>
+  </p:cSld>
+  <p:clrMapOvr>
+    <a:masterClrMapping/>
+  </p:clrMapOvr>
+</p:sld>
+</file>
+
 <file path=ppt/theme/theme1.xml><?xml version="1.0" encoding="utf-8"?>
 <a:theme xmlns:a="http://schemas.openxmlformats.org/drawingml/2006/main" name="Office">
   <a:themeElements>

</xml_diff>